<commit_message>
Updated DataSet Advanced slides and Table API slides
</commit_message>
<xml_diff>
--- a/slides/flink_batch_advanced.pptx
+++ b/slides/flink_batch_advanced.pptx
@@ -151,7 +151,7 @@
   </p:defaultTextStyle>
   <p:extLst>
     <p:ext uri="{EFAFB233-063F-42B5-8137-9DF3F51BA10A}">
-      <p15:sldGuideLst xmlns="" xmlns:p15="http://schemas.microsoft.com/office/powerpoint/2012/main">
+      <p15:sldGuideLst xmlns:p15="http://schemas.microsoft.com/office/powerpoint/2012/main" xmlns="">
         <p15:guide id="1" orient="horz" pos="2160">
           <p15:clr>
             <a:srgbClr val="A4A3A4"/>
@@ -4111,27 +4111,7 @@
                 <a:latin typeface="Avenir Next Regular"/>
                 <a:cs typeface="Avenir Next Regular"/>
               </a:rPr>
-              <a:t>June </a:t>
-            </a:r>
-            <a:r>
-              <a:rPr lang="en-US" dirty="0" smtClean="0">
-                <a:solidFill>
-                  <a:schemeClr val="bg1"/>
-                </a:solidFill>
-                <a:latin typeface="Avenir Next Regular"/>
-                <a:cs typeface="Avenir Next Regular"/>
-              </a:rPr>
-              <a:t>15th, </a:t>
-            </a:r>
-            <a:r>
-              <a:rPr lang="en-US" dirty="0" smtClean="0">
-                <a:solidFill>
-                  <a:schemeClr val="bg1"/>
-                </a:solidFill>
-                <a:latin typeface="Avenir Next Regular"/>
-                <a:cs typeface="Avenir Next Regular"/>
-              </a:rPr>
-              <a:t>2015</a:t>
+              <a:t>June 15th, 2015</a:t>
             </a:r>
             <a:endParaRPr lang="en-US" dirty="0">
               <a:solidFill>
@@ -12189,15 +12169,7 @@
           <a:p>
             <a:r>
               <a:rPr lang="en-US" dirty="0" smtClean="0"/>
-              <a:t>Apache </a:t>
-            </a:r>
-            <a:r>
-              <a:rPr lang="en-US" dirty="0" err="1" smtClean="0"/>
-              <a:t>Flink’s</a:t>
-            </a:r>
-            <a:r>
-              <a:rPr lang="en-US" dirty="0" smtClean="0"/>
-              <a:t> Type System</a:t>
+              <a:t>Type System and Keys</a:t>
             </a:r>
             <a:endParaRPr lang="en-US" dirty="0"/>
           </a:p>
@@ -16182,11 +16154,7 @@
           <a:p>
             <a:r>
               <a:rPr lang="en-US" dirty="0" smtClean="0"/>
-              <a:t>Flink aims to support </a:t>
-            </a:r>
-            <a:r>
-              <a:rPr lang="en-US" dirty="0" smtClean="0"/>
-              <a:t>all data types</a:t>
+              <a:t>Flink aims to support all data types</a:t>
             </a:r>
           </a:p>
           <a:p>
@@ -16195,7 +16163,6 @@
               <a:rPr lang="en-US" dirty="0" smtClean="0"/>
               <a:t>Ease of programming</a:t>
             </a:r>
-            <a:endParaRPr lang="en-US" dirty="0" smtClean="0"/>
           </a:p>
           <a:p>
             <a:pPr lvl="1"/>
@@ -18607,7 +18574,6 @@
               <a:rPr lang="en-US" dirty="0" smtClean="0"/>
               <a:t>Key types must be comparable</a:t>
             </a:r>
-            <a:endParaRPr lang="en-US" dirty="0" smtClean="0"/>
           </a:p>
           <a:p>
             <a:endParaRPr lang="en-US" dirty="0" smtClean="0"/>

</xml_diff>